<commit_message>
[bug] fix bug 48302
</commit_message>
<xml_diff>
--- a/sample/sample.pptx
+++ b/sample/sample.pptx
@@ -723,10 +723,6 @@
             <a:fld id="{8EC678CE-9857-4734-9115-53321CEB7787}" type="datetimeFigureOut">
               <a:t>3/27/2014</a:t>
             </a:fld>
-            <a:r>
-              <a:rPr/>
-              <a:t>27.03.201424.06.201413.08.201418.08.2014</a:t>
-            </a:r>
             <a:endParaRPr/>
           </a:p>
         </p:txBody>
@@ -779,7 +775,6 @@
   <p:clrMapOvr>
     <a:masterClrMapping/>
   </p:clrMapOvr>
-  <p:hf dt="1" ftr="1" hdr="1" sldNum="1"/>
 </p:sldLayout>
 </file>
 
@@ -907,10 +902,6 @@
             <a:fld id="{8EC678CE-9857-4734-9115-53321CEB7787}" type="datetimeFigureOut">
               <a:t>3/27/2014</a:t>
             </a:fld>
-            <a:r>
-              <a:rPr/>
-              <a:t>27.03.201424.06.201413.08.201418.08.2014</a:t>
-            </a:r>
             <a:endParaRPr/>
           </a:p>
         </p:txBody>
@@ -963,7 +954,6 @@
   <p:clrMapOvr>
     <a:masterClrMapping/>
   </p:clrMapOvr>
-  <p:hf dt="1" ftr="1" hdr="1" sldNum="1"/>
 </p:sldLayout>
 </file>
 
@@ -1101,10 +1091,6 @@
             <a:fld id="{8EC678CE-9857-4734-9115-53321CEB7787}" type="datetimeFigureOut">
               <a:t>3/27/2014</a:t>
             </a:fld>
-            <a:r>
-              <a:rPr/>
-              <a:t>27.03.201424.06.201413.08.201418.08.2014</a:t>
-            </a:r>
             <a:endParaRPr/>
           </a:p>
         </p:txBody>
@@ -1157,7 +1143,6 @@
   <p:clrMapOvr>
     <a:masterClrMapping/>
   </p:clrMapOvr>
-  <p:hf dt="1" ftr="1" hdr="1" sldNum="1"/>
 </p:sldLayout>
 </file>
 
@@ -1285,10 +1270,6 @@
             <a:fld id="{8EC678CE-9857-4734-9115-53321CEB7787}" type="datetimeFigureOut">
               <a:t>3/27/2014</a:t>
             </a:fld>
-            <a:r>
-              <a:rPr/>
-              <a:t>27.03.201424.06.201413.08.201418.08.2014</a:t>
-            </a:r>
             <a:endParaRPr/>
           </a:p>
         </p:txBody>
@@ -1341,7 +1322,6 @@
   <p:clrMapOvr>
     <a:masterClrMapping/>
   </p:clrMapOvr>
-  <p:hf dt="1" ftr="1" hdr="1" sldNum="1"/>
 </p:sldLayout>
 </file>
 
@@ -1532,10 +1512,6 @@
             <a:fld id="{8EC678CE-9857-4734-9115-53321CEB7787}" type="datetimeFigureOut">
               <a:t>3/27/2014</a:t>
             </a:fld>
-            <a:r>
-              <a:rPr/>
-              <a:t>27.03.201424.06.201413.08.201418.08.2014</a:t>
-            </a:r>
             <a:endParaRPr/>
           </a:p>
         </p:txBody>
@@ -1588,7 +1564,6 @@
   <p:clrMapOvr>
     <a:masterClrMapping/>
   </p:clrMapOvr>
-  <p:hf dt="1" ftr="1" hdr="1" sldNum="1"/>
 </p:sldLayout>
 </file>
 
@@ -1790,10 +1765,6 @@
             <a:fld id="{8EC678CE-9857-4734-9115-53321CEB7787}" type="datetimeFigureOut">
               <a:t>3/27/2014</a:t>
             </a:fld>
-            <a:r>
-              <a:rPr/>
-              <a:t>27.03.201424.06.201413.08.201418.08.2014</a:t>
-            </a:r>
             <a:endParaRPr/>
           </a:p>
         </p:txBody>
@@ -1846,7 +1817,6 @@
   <p:clrMapOvr>
     <a:masterClrMapping/>
   </p:clrMapOvr>
-  <p:hf dt="1" ftr="1" hdr="1" sldNum="1"/>
 </p:sldLayout>
 </file>
 
@@ -2185,10 +2155,6 @@
             <a:fld id="{8EC678CE-9857-4734-9115-53321CEB7787}" type="datetimeFigureOut">
               <a:t>3/27/2014</a:t>
             </a:fld>
-            <a:r>
-              <a:rPr/>
-              <a:t>27.03.201424.06.201413.08.201418.08.2014</a:t>
-            </a:r>
             <a:endParaRPr/>
           </a:p>
         </p:txBody>
@@ -2241,7 +2207,6 @@
   <p:clrMapOvr>
     <a:masterClrMapping/>
   </p:clrMapOvr>
-  <p:hf dt="1" ftr="1" hdr="1" sldNum="1"/>
 </p:sldLayout>
 </file>
 
@@ -2305,10 +2270,6 @@
             <a:fld id="{8EC678CE-9857-4734-9115-53321CEB7787}" type="datetimeFigureOut">
               <a:t>3/27/2014</a:t>
             </a:fld>
-            <a:r>
-              <a:rPr/>
-              <a:t>27.03.201424.06.201413.08.201418.08.2014</a:t>
-            </a:r>
             <a:endParaRPr/>
           </a:p>
         </p:txBody>
@@ -2361,7 +2322,6 @@
   <p:clrMapOvr>
     <a:masterClrMapping/>
   </p:clrMapOvr>
-  <p:hf dt="1" ftr="1" hdr="1" sldNum="1"/>
 </p:sldLayout>
 </file>
 
@@ -2401,10 +2361,6 @@
             <a:fld id="{8EC678CE-9857-4734-9115-53321CEB7787}" type="datetimeFigureOut">
               <a:t>3/27/2014</a:t>
             </a:fld>
-            <a:r>
-              <a:rPr/>
-              <a:t>27.03.201424.06.201413.08.201418.08.2014</a:t>
-            </a:r>
             <a:endParaRPr/>
           </a:p>
         </p:txBody>
@@ -2457,7 +2413,6 @@
   <p:clrMapOvr>
     <a:masterClrMapping/>
   </p:clrMapOvr>
-  <p:hf dt="1" ftr="1" hdr="1" sldNum="1"/>
 </p:sldLayout>
 </file>
 
@@ -2693,10 +2648,6 @@
             <a:fld id="{8EC678CE-9857-4734-9115-53321CEB7787}" type="datetimeFigureOut">
               <a:t>3/27/2014</a:t>
             </a:fld>
-            <a:r>
-              <a:rPr/>
-              <a:t>27.03.201424.06.201413.08.201418.08.2014</a:t>
-            </a:r>
             <a:endParaRPr/>
           </a:p>
         </p:txBody>
@@ -2749,7 +2700,6 @@
   <p:clrMapOvr>
     <a:masterClrMapping/>
   </p:clrMapOvr>
-  <p:hf dt="1" ftr="1" hdr="1" sldNum="1"/>
 </p:sldLayout>
 </file>
 
@@ -2954,10 +2904,6 @@
             <a:fld id="{8EC678CE-9857-4734-9115-53321CEB7787}" type="datetimeFigureOut">
               <a:t>3/27/2014</a:t>
             </a:fld>
-            <a:r>
-              <a:rPr/>
-              <a:t>27.03.201424.06.201413.08.201418.08.2014</a:t>
-            </a:r>
             <a:endParaRPr/>
           </a:p>
         </p:txBody>
@@ -3010,7 +2956,6 @@
   <p:clrMapOvr>
     <a:masterClrMapping/>
   </p:clrMapOvr>
-  <p:hf dt="1" ftr="1" hdr="1" sldNum="1"/>
 </p:sldLayout>
 </file>
 
@@ -3279,7 +3224,6 @@
     <p:sldLayoutId id="2147483658" r:id="rId10"/>
     <p:sldLayoutId id="2147483659" r:id="rId11"/>
   </p:sldLayoutIdLst>
-  <p:hf dt="1" ftr="1" hdr="1" sldNum="1"/>
   <p:txStyles>
     <p:titleStyle>
       <a:lvl1pPr algn="l">

</xml_diff>